<commit_message>
Agrega periodos y rigidez
</commit_message>
<xml_diff>
--- a/Presentación/Resumen Edificio.pptx
+++ b/Presentación/Resumen Edificio.pptx
@@ -14,9 +14,10 @@
     <p:sldId id="264" r:id="rId8"/>
     <p:sldId id="269" r:id="rId9"/>
     <p:sldId id="265" r:id="rId10"/>
-    <p:sldId id="266" r:id="rId11"/>
-    <p:sldId id="267" r:id="rId12"/>
-    <p:sldId id="260" r:id="rId13"/>
+    <p:sldId id="270" r:id="rId11"/>
+    <p:sldId id="266" r:id="rId12"/>
+    <p:sldId id="267" r:id="rId13"/>
+    <p:sldId id="260" r:id="rId14"/>
   </p:sldIdLst>
   <p:sldSz cx="12192000" cy="6858000"/>
   <p:notesSz cx="6858000" cy="9144000"/>
@@ -115,6 +116,11 @@
       </a:defRPr>
     </a:lvl9pPr>
   </p:defaultTextStyle>
+  <p:extLst>
+    <p:ext uri="{EFAFB233-063F-42B5-8137-9DF3F51BA10A}">
+      <p15:sldGuideLst xmlns:p15="http://schemas.microsoft.com/office/powerpoint/2012/main"/>
+    </p:ext>
+  </p:extLst>
 </p:presentation>
 </file>
 
@@ -306,7 +312,7 @@
           <a:p>
             <a:fld id="{59DCA0F0-58C3-4162-96F9-643FD3FBBE77}" type="datetimeFigureOut">
               <a:rPr lang="en-US" smtClean="0"/>
-              <a:t>12/28/2018</a:t>
+              <a:t>12/29/2018</a:t>
             </a:fld>
             <a:endParaRPr lang="en-US"/>
           </a:p>
@@ -644,7 +650,7 @@
           <a:p>
             <a:fld id="{59DCA0F0-58C3-4162-96F9-643FD3FBBE77}" type="datetimeFigureOut">
               <a:rPr lang="en-US" smtClean="0"/>
-              <a:t>12/28/2018</a:t>
+              <a:t>12/29/2018</a:t>
             </a:fld>
             <a:endParaRPr lang="en-US"/>
           </a:p>
@@ -1045,7 +1051,7 @@
           <a:p>
             <a:fld id="{59DCA0F0-58C3-4162-96F9-643FD3FBBE77}" type="datetimeFigureOut">
               <a:rPr lang="en-US" smtClean="0"/>
-              <a:t>12/28/2018</a:t>
+              <a:t>12/29/2018</a:t>
             </a:fld>
             <a:endParaRPr lang="en-US"/>
           </a:p>
@@ -1381,7 +1387,7 @@
           <a:p>
             <a:fld id="{59DCA0F0-58C3-4162-96F9-643FD3FBBE77}" type="datetimeFigureOut">
               <a:rPr lang="en-US" smtClean="0"/>
-              <a:t>12/28/2018</a:t>
+              <a:t>12/29/2018</a:t>
             </a:fld>
             <a:endParaRPr lang="en-US"/>
           </a:p>
@@ -1701,7 +1707,7 @@
           <a:p>
             <a:fld id="{59DCA0F0-58C3-4162-96F9-643FD3FBBE77}" type="datetimeFigureOut">
               <a:rPr lang="en-US" smtClean="0"/>
-              <a:t>12/28/2018</a:t>
+              <a:t>12/29/2018</a:t>
             </a:fld>
             <a:endParaRPr lang="en-US"/>
           </a:p>
@@ -2097,7 +2103,7 @@
           <a:p>
             <a:fld id="{59DCA0F0-58C3-4162-96F9-643FD3FBBE77}" type="datetimeFigureOut">
               <a:rPr lang="en-US" smtClean="0"/>
-              <a:t>12/28/2018</a:t>
+              <a:t>12/29/2018</a:t>
             </a:fld>
             <a:endParaRPr lang="en-US"/>
           </a:p>
@@ -2354,7 +2360,7 @@
           <a:p>
             <a:fld id="{59DCA0F0-58C3-4162-96F9-643FD3FBBE77}" type="datetimeFigureOut">
               <a:rPr lang="en-US" smtClean="0"/>
-              <a:t>12/28/2018</a:t>
+              <a:t>12/29/2018</a:t>
             </a:fld>
             <a:endParaRPr lang="en-US"/>
           </a:p>
@@ -2616,7 +2622,7 @@
           <a:p>
             <a:fld id="{59DCA0F0-58C3-4162-96F9-643FD3FBBE77}" type="datetimeFigureOut">
               <a:rPr lang="en-US" smtClean="0"/>
-              <a:t>12/28/2018</a:t>
+              <a:t>12/29/2018</a:t>
             </a:fld>
             <a:endParaRPr lang="en-US"/>
           </a:p>
@@ -2878,7 +2884,7 @@
           <a:p>
             <a:fld id="{59DCA0F0-58C3-4162-96F9-643FD3FBBE77}" type="datetimeFigureOut">
               <a:rPr lang="en-US" smtClean="0"/>
-              <a:t>12/28/2018</a:t>
+              <a:t>12/29/2018</a:t>
             </a:fld>
             <a:endParaRPr lang="en-US"/>
           </a:p>
@@ -3207,7 +3213,7 @@
           <a:p>
             <a:fld id="{59DCA0F0-58C3-4162-96F9-643FD3FBBE77}" type="datetimeFigureOut">
               <a:rPr lang="en-US" smtClean="0"/>
-              <a:t>12/28/2018</a:t>
+              <a:t>12/29/2018</a:t>
             </a:fld>
             <a:endParaRPr lang="en-US"/>
           </a:p>
@@ -3530,7 +3536,7 @@
           <a:p>
             <a:fld id="{59DCA0F0-58C3-4162-96F9-643FD3FBBE77}" type="datetimeFigureOut">
               <a:rPr lang="en-US" smtClean="0"/>
-              <a:t>12/28/2018</a:t>
+              <a:t>12/29/2018</a:t>
             </a:fld>
             <a:endParaRPr lang="en-US"/>
           </a:p>
@@ -3987,7 +3993,7 @@
           <a:p>
             <a:fld id="{59DCA0F0-58C3-4162-96F9-643FD3FBBE77}" type="datetimeFigureOut">
               <a:rPr lang="en-US" smtClean="0"/>
-              <a:t>12/28/2018</a:t>
+              <a:t>12/29/2018</a:t>
             </a:fld>
             <a:endParaRPr lang="en-US"/>
           </a:p>
@@ -4192,7 +4198,7 @@
           <a:p>
             <a:fld id="{59DCA0F0-58C3-4162-96F9-643FD3FBBE77}" type="datetimeFigureOut">
               <a:rPr lang="en-US" smtClean="0"/>
-              <a:t>12/28/2018</a:t>
+              <a:t>12/29/2018</a:t>
             </a:fld>
             <a:endParaRPr lang="en-US"/>
           </a:p>
@@ -4369,7 +4375,7 @@
           <a:p>
             <a:fld id="{59DCA0F0-58C3-4162-96F9-643FD3FBBE77}" type="datetimeFigureOut">
               <a:rPr lang="en-US" smtClean="0"/>
-              <a:t>12/28/2018</a:t>
+              <a:t>12/29/2018</a:t>
             </a:fld>
             <a:endParaRPr lang="en-US"/>
           </a:p>
@@ -4702,7 +4708,7 @@
           <a:p>
             <a:fld id="{59DCA0F0-58C3-4162-96F9-643FD3FBBE77}" type="datetimeFigureOut">
               <a:rPr lang="en-US" smtClean="0"/>
-              <a:t>12/28/2018</a:t>
+              <a:t>12/29/2018</a:t>
             </a:fld>
             <a:endParaRPr lang="en-US"/>
           </a:p>
@@ -5047,7 +5053,7 @@
           <a:p>
             <a:fld id="{59DCA0F0-58C3-4162-96F9-643FD3FBBE77}" type="datetimeFigureOut">
               <a:rPr lang="en-US" smtClean="0"/>
-              <a:t>12/28/2018</a:t>
+              <a:t>12/29/2018</a:t>
             </a:fld>
             <a:endParaRPr lang="en-US"/>
           </a:p>
@@ -7186,7 +7192,7 @@
           <a:p>
             <a:fld id="{59DCA0F0-58C3-4162-96F9-643FD3FBBE77}" type="datetimeFigureOut">
               <a:rPr lang="en-US" smtClean="0"/>
-              <a:t>12/28/2018</a:t>
+              <a:t>12/29/2018</a:t>
             </a:fld>
             <a:endParaRPr lang="en-US"/>
           </a:p>
@@ -7861,6 +7867,130 @@
           <p:cNvPr id="2" name="Title 1">
             <a:extLst>
               <a:ext uri="{FF2B5EF4-FFF2-40B4-BE49-F238E27FC236}">
+                <a16:creationId xmlns:a16="http://schemas.microsoft.com/office/drawing/2014/main" id="{8FF1FCF9-A38D-43BE-8376-E8B8DDD9152A}"/>
+              </a:ext>
+            </a:extLst>
+          </p:cNvPr>
+          <p:cNvSpPr>
+            <a:spLocks noGrp="1"/>
+          </p:cNvSpPr>
+          <p:nvPr>
+            <p:ph type="title"/>
+          </p:nvPr>
+        </p:nvSpPr>
+        <p:spPr>
+          <a:xfrm>
+            <a:off x="2592925" y="624110"/>
+            <a:ext cx="8911687" cy="1280890"/>
+          </a:xfrm>
+        </p:spPr>
+        <p:txBody>
+          <a:bodyPr/>
+          <a:lstStyle/>
+          <a:p>
+            <a:r>
+              <a:rPr lang="es-CL" dirty="0"/>
+              <a:t>Acoplamiento y rigidez</a:t>
+            </a:r>
+            <a:endParaRPr lang="en-US" dirty="0"/>
+          </a:p>
+        </p:txBody>
+      </p:sp>
+      <p:pic>
+        <p:nvPicPr>
+          <p:cNvPr id="6" name="Picture 5">
+            <a:extLst>
+              <a:ext uri="{FF2B5EF4-FFF2-40B4-BE49-F238E27FC236}">
+                <a16:creationId xmlns:a16="http://schemas.microsoft.com/office/drawing/2014/main" id="{634FD0AF-18EF-4284-8603-2A9BD06179D4}"/>
+              </a:ext>
+            </a:extLst>
+          </p:cNvPr>
+          <p:cNvPicPr>
+            <a:picLocks noChangeAspect="1"/>
+          </p:cNvPicPr>
+          <p:nvPr/>
+        </p:nvPicPr>
+        <p:blipFill>
+          <a:blip r:embed="rId2"/>
+          <a:stretch>
+            <a:fillRect/>
+          </a:stretch>
+        </p:blipFill>
+        <p:spPr>
+          <a:xfrm>
+            <a:off x="2332036" y="2490146"/>
+            <a:ext cx="3654816" cy="2850340"/>
+          </a:xfrm>
+          <a:prstGeom prst="rect">
+            <a:avLst/>
+          </a:prstGeom>
+        </p:spPr>
+      </p:pic>
+      <p:pic>
+        <p:nvPicPr>
+          <p:cNvPr id="7" name="Picture 6">
+            <a:extLst>
+              <a:ext uri="{FF2B5EF4-FFF2-40B4-BE49-F238E27FC236}">
+                <a16:creationId xmlns:a16="http://schemas.microsoft.com/office/drawing/2014/main" id="{D27E07C4-EEB1-4C43-BAD3-2FF2D3F55935}"/>
+              </a:ext>
+            </a:extLst>
+          </p:cNvPr>
+          <p:cNvPicPr>
+            <a:picLocks noChangeAspect="1"/>
+          </p:cNvPicPr>
+          <p:nvPr/>
+        </p:nvPicPr>
+        <p:blipFill>
+          <a:blip r:embed="rId3"/>
+          <a:stretch>
+            <a:fillRect/>
+          </a:stretch>
+        </p:blipFill>
+        <p:spPr>
+          <a:xfrm>
+            <a:off x="6205150" y="3286329"/>
+            <a:ext cx="4131284" cy="1791510"/>
+          </a:xfrm>
+          <a:prstGeom prst="rect">
+            <a:avLst/>
+          </a:prstGeom>
+        </p:spPr>
+      </p:pic>
+    </p:spTree>
+    <p:extLst>
+      <p:ext uri="{BB962C8B-B14F-4D97-AF65-F5344CB8AC3E}">
+        <p14:creationId xmlns:p14="http://schemas.microsoft.com/office/powerpoint/2010/main" val="1317153235"/>
+      </p:ext>
+    </p:extLst>
+  </p:cSld>
+  <p:clrMapOvr>
+    <a:masterClrMapping/>
+  </p:clrMapOvr>
+</p:sld>
+</file>
+
+<file path=ppt/slides/slide11.xml><?xml version="1.0" encoding="utf-8"?>
+<p:sld xmlns:a="http://schemas.openxmlformats.org/drawingml/2006/main" xmlns:r="http://schemas.openxmlformats.org/officeDocument/2006/relationships" xmlns:p="http://schemas.openxmlformats.org/presentationml/2006/main">
+  <p:cSld>
+    <p:spTree>
+      <p:nvGrpSpPr>
+        <p:cNvPr id="1" name=""/>
+        <p:cNvGrpSpPr/>
+        <p:nvPr/>
+      </p:nvGrpSpPr>
+      <p:grpSpPr>
+        <a:xfrm>
+          <a:off x="0" y="0"/>
+          <a:ext cx="0" cy="0"/>
+          <a:chOff x="0" y="0"/>
+          <a:chExt cx="0" cy="0"/>
+        </a:xfrm>
+      </p:grpSpPr>
+      <p:sp>
+        <p:nvSpPr>
+          <p:cNvPr id="2" name="Title 1">
+            <a:extLst>
+              <a:ext uri="{FF2B5EF4-FFF2-40B4-BE49-F238E27FC236}">
                 <a16:creationId xmlns:a16="http://schemas.microsoft.com/office/drawing/2014/main" id="{C659BFA7-499E-49B9-B2B0-D4EFD7546B42}"/>
               </a:ext>
             </a:extLst>
@@ -7965,7 +8095,7 @@
 </p:sld>
 </file>
 
-<file path=ppt/slides/slide11.xml><?xml version="1.0" encoding="utf-8"?>
+<file path=ppt/slides/slide12.xml><?xml version="1.0" encoding="utf-8"?>
 <p:sld xmlns:a="http://schemas.openxmlformats.org/drawingml/2006/main" xmlns:r="http://schemas.openxmlformats.org/officeDocument/2006/relationships" xmlns:p="http://schemas.openxmlformats.org/presentationml/2006/main">
   <p:cSld>
     <p:spTree>
@@ -8091,7 +8221,7 @@
 </p:sld>
 </file>
 
-<file path=ppt/slides/slide12.xml><?xml version="1.0" encoding="utf-8"?>
+<file path=ppt/slides/slide13.xml><?xml version="1.0" encoding="utf-8"?>
 <p:sld xmlns:a="http://schemas.openxmlformats.org/drawingml/2006/main" xmlns:r="http://schemas.openxmlformats.org/officeDocument/2006/relationships" xmlns:p="http://schemas.openxmlformats.org/presentationml/2006/main">
   <p:cSld>
     <p:spTree>

</xml_diff>